<commit_message>
Updating week 3 slides
</commit_message>
<xml_diff>
--- a/COMP2x0-portfolio-workshop-04.pptx
+++ b/COMP2x0-portfolio-workshop-04.pptx
@@ -585,7 +585,7 @@
           <a:p>
             <a:fld id="{EA0C0817-A112-4847-8014-A94B7D2A4EA3}" type="datetime1">
               <a:rPr lang="en-US" smtClean="0"/>
-              <a:t>1/21/2021</a:t>
+              <a:t>2/4/2021</a:t>
             </a:fld>
             <a:endParaRPr lang="en-US" dirty="0"/>
           </a:p>
@@ -787,7 +787,7 @@
           <a:p>
             <a:fld id="{134F40B7-36AB-4376-BE14-EF7004D79BB9}" type="datetime1">
               <a:rPr lang="en-US" smtClean="0"/>
-              <a:t>1/21/2021</a:t>
+              <a:t>2/4/2021</a:t>
             </a:fld>
             <a:endParaRPr lang="en-US"/>
           </a:p>
@@ -967,7 +967,7 @@
           <a:p>
             <a:fld id="{FF87CAB8-DCAE-46A5-AADA-B3FAD11A54E0}" type="datetime1">
               <a:rPr lang="en-US" smtClean="0"/>
-              <a:t>1/21/2021</a:t>
+              <a:t>2/4/2021</a:t>
             </a:fld>
             <a:endParaRPr lang="en-US"/>
           </a:p>
@@ -1137,7 +1137,7 @@
           <a:p>
             <a:fld id="{7332B432-ACDA-4023-A761-2BAB76577B62}" type="datetime1">
               <a:rPr lang="en-US" smtClean="0"/>
-              <a:t>1/21/2021</a:t>
+              <a:t>2/4/2021</a:t>
             </a:fld>
             <a:endParaRPr lang="en-US"/>
           </a:p>
@@ -1736,7 +1736,7 @@
           <a:p>
             <a:fld id="{D9C646AA-F36E-4540-911D-FFFC0A0EF24A}" type="datetime1">
               <a:rPr lang="en-US" smtClean="0"/>
-              <a:t>1/21/2021</a:t>
+              <a:t>2/4/2021</a:t>
             </a:fld>
             <a:endParaRPr lang="en-US" dirty="0"/>
           </a:p>
@@ -2056,7 +2056,7 @@
           <a:p>
             <a:fld id="{69186D26-FA5F-4637-B602-B7C2DC34CFD4}" type="datetime1">
               <a:rPr lang="en-US" smtClean="0"/>
-              <a:t>1/21/2021</a:t>
+              <a:t>2/4/2021</a:t>
             </a:fld>
             <a:endParaRPr lang="en-US"/>
           </a:p>
@@ -2493,7 +2493,7 @@
           <a:p>
             <a:fld id="{8A7F15D8-96D1-4781-BC50-CA8A088B2FE4}" type="datetime1">
               <a:rPr lang="en-US" smtClean="0"/>
-              <a:t>1/21/2021</a:t>
+              <a:t>2/4/2021</a:t>
             </a:fld>
             <a:endParaRPr lang="en-US"/>
           </a:p>
@@ -2611,7 +2611,7 @@
           <a:p>
             <a:fld id="{F9A96C99-B8F8-4528-BD05-0E16E943DC09}" type="datetime1">
               <a:rPr lang="en-US" smtClean="0"/>
-              <a:t>1/21/2021</a:t>
+              <a:t>2/4/2021</a:t>
             </a:fld>
             <a:endParaRPr lang="en-US"/>
           </a:p>
@@ -2706,7 +2706,7 @@
           <a:p>
             <a:fld id="{03636942-C211-4B28-8DBD-C953E00AF71B}" type="datetime1">
               <a:rPr lang="en-US" smtClean="0"/>
-              <a:t>1/21/2021</a:t>
+              <a:t>2/4/2021</a:t>
             </a:fld>
             <a:endParaRPr lang="en-US"/>
           </a:p>
@@ -3123,7 +3123,7 @@
           <a:p>
             <a:fld id="{7E8D12A6-918A-48BD-8CB9-CA713993B0EA}" type="datetime1">
               <a:rPr lang="en-US" smtClean="0"/>
-              <a:t>1/21/2021</a:t>
+              <a:t>2/4/2021</a:t>
             </a:fld>
             <a:endParaRPr lang="en-US"/>
           </a:p>
@@ -3385,7 +3385,7 @@
             <a:fld id="{E778CE86-875F-4587-BCF6-FA054AFC0D53}" type="datetime1">
               <a:rPr lang="en-US" smtClean="0"/>
               <a:pPr/>
-              <a:t>1/21/2021</a:t>
+              <a:t>2/4/2021</a:t>
             </a:fld>
             <a:endParaRPr lang="en-US" dirty="0"/>
           </a:p>
@@ -3901,7 +3901,7 @@
           <a:p>
             <a:fld id="{F6FA2B21-3FCD-4721-B95C-427943F61125}" type="datetime1">
               <a:rPr lang="en-US" smtClean="0"/>
-              <a:t>1/21/2021</a:t>
+              <a:t>2/4/2021</a:t>
             </a:fld>
             <a:endParaRPr lang="en-US"/>
           </a:p>
@@ -6382,7 +6382,7 @@
           <a:p>
             <a:r>
               <a:rPr lang="en-GB" dirty="0"/>
-              <a:t>How to construct/defend an argument</a:t>
+              <a:t>Suggested activities</a:t>
             </a:r>
           </a:p>
         </p:txBody>
@@ -6415,128 +6415,148 @@
           </a:bodyPr>
           <a:lstStyle/>
           <a:p>
+            <a:pPr marL="514350" indent="-514350">
+              <a:buFont typeface="+mj-lt"/>
+              <a:buAutoNum type="arabicPeriod"/>
+            </a:pPr>
             <a:r>
               <a:rPr lang="en-GB" sz="2000" b="1" dirty="0"/>
-              <a:t>Purpose</a:t>
+              <a:t>Top recommendation </a:t>
             </a:r>
             <a:r>
               <a:rPr lang="en-GB" sz="2000" dirty="0"/>
-              <a:t>: to persuade another person that a course of action you’ve taken is reasonable.</a:t>
-            </a:r>
-          </a:p>
-          <a:p>
+              <a:t>–</a:t>
+            </a:r>
             <a:r>
               <a:rPr lang="en-GB" sz="2000" b="1" dirty="0"/>
-              <a:t>Structure</a:t>
+              <a:t> </a:t>
             </a:r>
             <a:r>
               <a:rPr lang="en-GB" sz="2000" dirty="0"/>
-              <a:t>:</a:t>
-            </a:r>
-          </a:p>
-          <a:p>
-            <a:pPr lvl="1"/>
-            <a:r>
-              <a:rPr lang="en-GB" sz="1800" i="1" dirty="0"/>
-              <a:t>Present</a:t>
-            </a:r>
-            <a:r>
-              <a:rPr lang="en-GB" sz="1800" dirty="0"/>
-              <a:t> a claim upon which your decision/action is based</a:t>
-            </a:r>
-          </a:p>
-          <a:p>
-            <a:pPr lvl="1"/>
-            <a:r>
-              <a:rPr lang="en-GB" sz="1800" i="1" dirty="0"/>
-              <a:t>Consider</a:t>
-            </a:r>
-            <a:r>
-              <a:rPr lang="en-GB" sz="1800" dirty="0"/>
-              <a:t> potential evidence to </a:t>
-            </a:r>
-            <a:r>
-              <a:rPr lang="en-GB" sz="1800" i="1" u="sng" dirty="0"/>
-              <a:t>both</a:t>
-            </a:r>
-            <a:r>
-              <a:rPr lang="en-GB" sz="1800" dirty="0"/>
-              <a:t> support </a:t>
-            </a:r>
-            <a:r>
-              <a:rPr lang="en-GB" sz="1800" i="1" u="sng" dirty="0"/>
-              <a:t>and</a:t>
-            </a:r>
-            <a:r>
-              <a:rPr lang="en-GB" sz="1800" dirty="0"/>
-              <a:t> refute your claim</a:t>
-            </a:r>
-          </a:p>
-          <a:p>
-            <a:pPr lvl="2"/>
-            <a:r>
-              <a:rPr lang="en-GB" sz="1700" dirty="0"/>
-              <a:t>Pros and cons</a:t>
-            </a:r>
-          </a:p>
-          <a:p>
-            <a:pPr lvl="2"/>
-            <a:r>
-              <a:rPr lang="en-GB" sz="1700" dirty="0"/>
-              <a:t>Experimental evidence/previous (documented) studies/experiences – hard facts!</a:t>
-            </a:r>
-          </a:p>
-          <a:p>
-            <a:pPr lvl="1"/>
-            <a:r>
-              <a:rPr lang="en-GB" sz="1800" i="1" dirty="0"/>
-              <a:t>Consider</a:t>
-            </a:r>
-            <a:r>
-              <a:rPr lang="en-GB" sz="1800" dirty="0"/>
-              <a:t> alternatives in the same way</a:t>
-            </a:r>
-          </a:p>
-          <a:p>
-            <a:pPr lvl="1"/>
-            <a:r>
-              <a:rPr lang="en-GB" sz="1800" i="1" dirty="0"/>
-              <a:t>Justify</a:t>
-            </a:r>
-            <a:r>
-              <a:rPr lang="en-GB" sz="1800" dirty="0"/>
-              <a:t> your decision based on the evidence presented</a:t>
-            </a:r>
-            <a:endParaRPr lang="en-GB" sz="2000" dirty="0"/>
-          </a:p>
-          <a:p>
-            <a:pPr marL="0" indent="0">
-              <a:buNone/>
+              <a:t>spend at least some time investigating web platforms (e.g. </a:t>
+            </a:r>
+            <a:r>
+              <a:rPr lang="en-GB" sz="2000" dirty="0" err="1"/>
+              <a:t>Wordpress</a:t>
+            </a:r>
+            <a:r>
+              <a:rPr lang="en-GB" sz="2000" dirty="0"/>
+              <a:t>, GitHub pages, </a:t>
+            </a:r>
+            <a:r>
+              <a:rPr lang="en-GB" sz="2000" dirty="0" err="1"/>
+              <a:t>Wix</a:t>
+            </a:r>
+            <a:r>
+              <a:rPr lang="en-GB" sz="2000" dirty="0"/>
+              <a:t>, Weebly…) to determine:</a:t>
+            </a:r>
+          </a:p>
+          <a:p>
+            <a:pPr marL="788670" lvl="1" indent="-514350">
+              <a:buFont typeface="+mj-lt"/>
+              <a:buAutoNum type="alphaLcParenR"/>
             </a:pPr>
-            <a:endParaRPr lang="en-GB" sz="1600" dirty="0"/>
-          </a:p>
-          <a:p>
-            <a:pPr marL="0" indent="0">
-              <a:buNone/>
+            <a:r>
+              <a:rPr lang="en-GB" sz="2000" dirty="0"/>
+              <a:t>How easy is it to use/get the look you want? Try setting up a basic page with some text and images.</a:t>
+            </a:r>
+          </a:p>
+          <a:p>
+            <a:pPr marL="788670" lvl="1" indent="-514350">
+              <a:buFont typeface="+mj-lt"/>
+              <a:buAutoNum type="alphaLcParenR"/>
             </a:pPr>
             <a:r>
-              <a:rPr lang="en-GB" sz="1600" dirty="0"/>
-              <a:t>More info/practice: </a:t>
-            </a:r>
-            <a:r>
-              <a:rPr lang="en-GB" sz="1600" dirty="0">
-                <a:hlinkClick r:id="rId2"/>
-              </a:rPr>
-              <a:t>https://www.ucas.com/file/62641/download?token=sZT0YGZN</a:t>
-            </a:r>
-            <a:endParaRPr lang="en-GB" sz="1600" dirty="0"/>
+              <a:rPr lang="en-GB" sz="2000" dirty="0"/>
+              <a:t>How easy is it to download an html copy that works offline? (</a:t>
+            </a:r>
+            <a:r>
+              <a:rPr lang="en-GB" sz="2000" i="1" dirty="0"/>
+              <a:t>Test this out!)</a:t>
+            </a:r>
+          </a:p>
+          <a:p>
+            <a:pPr lvl="2">
+              <a:buFont typeface="Arial" panose="020B0604020202020204" pitchFamily="34" charset="0"/>
+              <a:buChar char="•"/>
+            </a:pPr>
+            <a:r>
+              <a:rPr lang="en-GB" sz="2000" dirty="0"/>
+              <a:t>Investigate 3rd party tools if need be, e.g. </a:t>
+            </a:r>
+            <a:r>
+              <a:rPr lang="en-GB" sz="2000" dirty="0" err="1"/>
+              <a:t>SiteSucker</a:t>
+            </a:r>
+            <a:r>
+              <a:rPr lang="en-GB" sz="2000" dirty="0"/>
+              <a:t> (MacOS), </a:t>
+            </a:r>
+            <a:r>
+              <a:rPr lang="en-GB" sz="2000" dirty="0" err="1"/>
+              <a:t>WebCopy</a:t>
+            </a:r>
+            <a:r>
+              <a:rPr lang="en-GB" sz="2000" dirty="0"/>
+              <a:t> (Windows)</a:t>
+            </a:r>
+          </a:p>
+          <a:p>
+            <a:pPr marL="514350" indent="-514350">
+              <a:buFont typeface="+mj-lt"/>
+              <a:buAutoNum type="arabicPeriod"/>
+            </a:pPr>
+            <a:r>
+              <a:rPr lang="en-GB" sz="2000" b="1" dirty="0"/>
+              <a:t>Also recommended </a:t>
+            </a:r>
+            <a:r>
+              <a:rPr lang="en-GB" sz="2000" dirty="0"/>
+              <a:t>–</a:t>
+            </a:r>
+          </a:p>
+          <a:p>
+            <a:pPr marL="788670" lvl="1" indent="-514350">
+              <a:buFont typeface="+mj-lt"/>
+              <a:buAutoNum type="alphaLcParenR"/>
+            </a:pPr>
+            <a:r>
+              <a:rPr lang="en-GB" sz="2000" dirty="0"/>
+              <a:t>Start writing about the research you’ve done and your argument.</a:t>
+            </a:r>
+          </a:p>
+          <a:p>
+            <a:pPr marL="788670" lvl="1" indent="-514350">
+              <a:buFont typeface="+mj-lt"/>
+              <a:buAutoNum type="alphaLcParenR"/>
+            </a:pPr>
+            <a:r>
+              <a:rPr lang="en-GB" sz="2000" dirty="0"/>
+              <a:t>Start drafting your poster – e.g. make notes on content for each section; create/start creating your UML diagram.</a:t>
+            </a:r>
+          </a:p>
+          <a:p>
+            <a:pPr marL="514350" indent="-514350">
+              <a:buFont typeface="+mj-lt"/>
+              <a:buAutoNum type="arabicPeriod"/>
+            </a:pPr>
+            <a:r>
+              <a:rPr lang="en-GB" sz="2000" b="1" dirty="0"/>
+              <a:t>If you need to</a:t>
+            </a:r>
+            <a:r>
+              <a:rPr lang="en-GB" sz="2000" dirty="0"/>
+              <a:t> – continue work on your artefact.</a:t>
+            </a:r>
+            <a:endParaRPr lang="en-GB" sz="2000" b="1" dirty="0"/>
           </a:p>
         </p:txBody>
       </p:sp>
     </p:spTree>
     <p:extLst>
       <p:ext uri="{BB962C8B-B14F-4D97-AF65-F5344CB8AC3E}">
-        <p14:creationId xmlns:p14="http://schemas.microsoft.com/office/powerpoint/2010/main" val="588314911"/>
+        <p14:creationId xmlns:p14="http://schemas.microsoft.com/office/powerpoint/2010/main" val="3918112203"/>
       </p:ext>
     </p:extLst>
   </p:cSld>
@@ -6594,33 +6614,15 @@
                                   </p:childTnLst>
                                 </p:cTn>
                               </p:par>
-                            </p:childTnLst>
-                          </p:cTn>
-                        </p:par>
-                      </p:childTnLst>
-                    </p:cTn>
-                  </p:par>
-                  <p:par>
-                    <p:cTn id="7" fill="hold">
-                      <p:stCondLst>
-                        <p:cond delay="indefinite"/>
-                      </p:stCondLst>
-                      <p:childTnLst>
-                        <p:par>
-                          <p:cTn id="8" fill="hold">
-                            <p:stCondLst>
-                              <p:cond delay="0"/>
-                            </p:stCondLst>
-                            <p:childTnLst>
                               <p:par>
-                                <p:cTn id="9" presetID="1" presetClass="entr" presetSubtype="0" fill="hold" grpId="0" nodeType="clickEffect">
+                                <p:cTn id="7" presetID="1" presetClass="entr" presetSubtype="0" fill="hold" grpId="0" nodeType="withEffect">
                                   <p:stCondLst>
                                     <p:cond delay="0"/>
                                   </p:stCondLst>
                                   <p:childTnLst>
                                     <p:set>
                                       <p:cBhvr>
-                                        <p:cTn id="10" dur="1" fill="hold">
+                                        <p:cTn id="8" dur="1" fill="hold">
                                           <p:stCondLst>
                                             <p:cond delay="0"/>
                                           </p:stCondLst>
@@ -6643,33 +6645,15 @@
                                   </p:childTnLst>
                                 </p:cTn>
                               </p:par>
-                            </p:childTnLst>
-                          </p:cTn>
-                        </p:par>
-                      </p:childTnLst>
-                    </p:cTn>
-                  </p:par>
-                  <p:par>
-                    <p:cTn id="11" fill="hold">
-                      <p:stCondLst>
-                        <p:cond delay="indefinite"/>
-                      </p:stCondLst>
-                      <p:childTnLst>
-                        <p:par>
-                          <p:cTn id="12" fill="hold">
-                            <p:stCondLst>
-                              <p:cond delay="0"/>
-                            </p:stCondLst>
-                            <p:childTnLst>
                               <p:par>
-                                <p:cTn id="13" presetID="1" presetClass="entr" presetSubtype="0" fill="hold" grpId="0" nodeType="clickEffect">
+                                <p:cTn id="9" presetID="1" presetClass="entr" presetSubtype="0" fill="hold" grpId="0" nodeType="withEffect">
                                   <p:stCondLst>
                                     <p:cond delay="0"/>
                                   </p:stCondLst>
                                   <p:childTnLst>
                                     <p:set>
                                       <p:cBhvr>
-                                        <p:cTn id="14" dur="1" fill="hold">
+                                        <p:cTn id="10" dur="1" fill="hold">
                                           <p:stCondLst>
                                             <p:cond delay="0"/>
                                           </p:stCondLst>
@@ -6692,33 +6676,15 @@
                                   </p:childTnLst>
                                 </p:cTn>
                               </p:par>
-                            </p:childTnLst>
-                          </p:cTn>
-                        </p:par>
-                      </p:childTnLst>
-                    </p:cTn>
-                  </p:par>
-                  <p:par>
-                    <p:cTn id="15" fill="hold">
-                      <p:stCondLst>
-                        <p:cond delay="indefinite"/>
-                      </p:stCondLst>
-                      <p:childTnLst>
-                        <p:par>
-                          <p:cTn id="16" fill="hold">
-                            <p:stCondLst>
-                              <p:cond delay="0"/>
-                            </p:stCondLst>
-                            <p:childTnLst>
                               <p:par>
-                                <p:cTn id="17" presetID="1" presetClass="entr" presetSubtype="0" fill="hold" grpId="0" nodeType="clickEffect">
+                                <p:cTn id="11" presetID="1" presetClass="entr" presetSubtype="0" fill="hold" grpId="0" nodeType="withEffect">
                                   <p:stCondLst>
                                     <p:cond delay="0"/>
                                   </p:stCondLst>
                                   <p:childTnLst>
                                     <p:set>
                                       <p:cBhvr>
-                                        <p:cTn id="18" dur="1" fill="hold">
+                                        <p:cTn id="12" dur="1" fill="hold">
                                           <p:stCondLst>
                                             <p:cond delay="0"/>
                                           </p:stCondLst>
@@ -6748,26 +6714,26 @@
                     </p:cTn>
                   </p:par>
                   <p:par>
-                    <p:cTn id="19" fill="hold">
+                    <p:cTn id="13" fill="hold">
                       <p:stCondLst>
                         <p:cond delay="indefinite"/>
                       </p:stCondLst>
                       <p:childTnLst>
                         <p:par>
-                          <p:cTn id="20" fill="hold">
+                          <p:cTn id="14" fill="hold">
                             <p:stCondLst>
                               <p:cond delay="0"/>
                             </p:stCondLst>
                             <p:childTnLst>
                               <p:par>
-                                <p:cTn id="21" presetID="1" presetClass="entr" presetSubtype="0" fill="hold" grpId="0" nodeType="clickEffect">
+                                <p:cTn id="15" presetID="1" presetClass="entr" presetSubtype="0" fill="hold" grpId="0" nodeType="clickEffect">
                                   <p:stCondLst>
                                     <p:cond delay="0"/>
                                   </p:stCondLst>
                                   <p:childTnLst>
                                     <p:set>
                                       <p:cBhvr>
-                                        <p:cTn id="22" dur="1" fill="hold">
+                                        <p:cTn id="16" dur="1" fill="hold">
                                           <p:stCondLst>
                                             <p:cond delay="0"/>
                                           </p:stCondLst>
@@ -6790,33 +6756,15 @@
                                   </p:childTnLst>
                                 </p:cTn>
                               </p:par>
-                            </p:childTnLst>
-                          </p:cTn>
-                        </p:par>
-                      </p:childTnLst>
-                    </p:cTn>
-                  </p:par>
-                  <p:par>
-                    <p:cTn id="23" fill="hold">
-                      <p:stCondLst>
-                        <p:cond delay="indefinite"/>
-                      </p:stCondLst>
-                      <p:childTnLst>
-                        <p:par>
-                          <p:cTn id="24" fill="hold">
-                            <p:stCondLst>
-                              <p:cond delay="0"/>
-                            </p:stCondLst>
-                            <p:childTnLst>
                               <p:par>
-                                <p:cTn id="25" presetID="1" presetClass="entr" presetSubtype="0" fill="hold" grpId="0" nodeType="clickEffect">
+                                <p:cTn id="17" presetID="1" presetClass="entr" presetSubtype="0" fill="hold" grpId="0" nodeType="withEffect">
                                   <p:stCondLst>
                                     <p:cond delay="0"/>
                                   </p:stCondLst>
                                   <p:childTnLst>
                                     <p:set>
                                       <p:cBhvr>
-                                        <p:cTn id="26" dur="1" fill="hold">
+                                        <p:cTn id="18" dur="1" fill="hold">
                                           <p:stCondLst>
                                             <p:cond delay="0"/>
                                           </p:stCondLst>
@@ -6839,33 +6787,15 @@
                                   </p:childTnLst>
                                 </p:cTn>
                               </p:par>
-                            </p:childTnLst>
-                          </p:cTn>
-                        </p:par>
-                      </p:childTnLst>
-                    </p:cTn>
-                  </p:par>
-                  <p:par>
-                    <p:cTn id="27" fill="hold">
-                      <p:stCondLst>
-                        <p:cond delay="indefinite"/>
-                      </p:stCondLst>
-                      <p:childTnLst>
-                        <p:par>
-                          <p:cTn id="28" fill="hold">
-                            <p:stCondLst>
-                              <p:cond delay="0"/>
-                            </p:stCondLst>
-                            <p:childTnLst>
                               <p:par>
-                                <p:cTn id="29" presetID="1" presetClass="entr" presetSubtype="0" fill="hold" grpId="0" nodeType="clickEffect">
+                                <p:cTn id="19" presetID="1" presetClass="entr" presetSubtype="0" fill="hold" grpId="0" nodeType="withEffect">
                                   <p:stCondLst>
                                     <p:cond delay="0"/>
                                   </p:stCondLst>
                                   <p:childTnLst>
                                     <p:set>
                                       <p:cBhvr>
-                                        <p:cTn id="30" dur="1" fill="hold">
+                                        <p:cTn id="20" dur="1" fill="hold">
                                           <p:stCondLst>
                                             <p:cond delay="0"/>
                                           </p:stCondLst>
@@ -6895,26 +6825,26 @@
                     </p:cTn>
                   </p:par>
                   <p:par>
-                    <p:cTn id="31" fill="hold">
+                    <p:cTn id="21" fill="hold">
                       <p:stCondLst>
                         <p:cond delay="indefinite"/>
                       </p:stCondLst>
                       <p:childTnLst>
                         <p:par>
-                          <p:cTn id="32" fill="hold">
+                          <p:cTn id="22" fill="hold">
                             <p:stCondLst>
                               <p:cond delay="0"/>
                             </p:stCondLst>
                             <p:childTnLst>
                               <p:par>
-                                <p:cTn id="33" presetID="1" presetClass="entr" presetSubtype="0" fill="hold" grpId="0" nodeType="clickEffect">
+                                <p:cTn id="23" presetID="1" presetClass="entr" presetSubtype="0" fill="hold" grpId="0" nodeType="clickEffect">
                                   <p:stCondLst>
                                     <p:cond delay="0"/>
                                   </p:stCondLst>
                                   <p:childTnLst>
                                     <p:set>
                                       <p:cBhvr>
-                                        <p:cTn id="34" dur="1" fill="hold">
+                                        <p:cTn id="24" dur="1" fill="hold">
                                           <p:stCondLst>
                                             <p:cond delay="0"/>
                                           </p:stCondLst>
@@ -6923,55 +6853,6 @@
                                           <p:spTgt spid="3">
                                             <p:txEl>
                                               <p:pRg st="7" end="7"/>
-                                            </p:txEl>
-                                          </p:spTgt>
-                                        </p:tgtEl>
-                                        <p:attrNameLst>
-                                          <p:attrName>style.visibility</p:attrName>
-                                        </p:attrNameLst>
-                                      </p:cBhvr>
-                                      <p:to>
-                                        <p:strVal val="visible"/>
-                                      </p:to>
-                                    </p:set>
-                                  </p:childTnLst>
-                                </p:cTn>
-                              </p:par>
-                            </p:childTnLst>
-                          </p:cTn>
-                        </p:par>
-                      </p:childTnLst>
-                    </p:cTn>
-                  </p:par>
-                  <p:par>
-                    <p:cTn id="35" fill="hold">
-                      <p:stCondLst>
-                        <p:cond delay="indefinite"/>
-                      </p:stCondLst>
-                      <p:childTnLst>
-                        <p:par>
-                          <p:cTn id="36" fill="hold">
-                            <p:stCondLst>
-                              <p:cond delay="0"/>
-                            </p:stCondLst>
-                            <p:childTnLst>
-                              <p:par>
-                                <p:cTn id="37" presetID="1" presetClass="entr" presetSubtype="0" fill="hold" grpId="0" nodeType="clickEffect">
-                                  <p:stCondLst>
-                                    <p:cond delay="0"/>
-                                  </p:stCondLst>
-                                  <p:childTnLst>
-                                    <p:set>
-                                      <p:cBhvr>
-                                        <p:cTn id="38" dur="1" fill="hold">
-                                          <p:stCondLst>
-                                            <p:cond delay="0"/>
-                                          </p:stCondLst>
-                                        </p:cTn>
-                                        <p:tgtEl>
-                                          <p:spTgt spid="3">
-                                            <p:txEl>
-                                              <p:pRg st="9" end="9"/>
                                             </p:txEl>
                                           </p:spTgt>
                                         </p:tgtEl>
@@ -7014,7 +6895,7 @@
       </p:par>
     </p:tnLst>
     <p:bldLst>
-      <p:bldP spid="3" grpId="0" uiExpand="1" build="p"/>
+      <p:bldP spid="3" grpId="0" build="p"/>
     </p:bldLst>
   </p:timing>
 </p:sld>

</xml_diff>